<commit_message>
For Bug 36035 70425 Update translations of layouts and templates of Slide masters
</commit_message>
<xml_diff>
--- a/new/cs-CZ/new.pptx
+++ b/new/cs-CZ/new.pptx
@@ -2888,7 +2888,7 @@
       </p:grpSpPr>
       <p:sp>
         <p:nvSpPr>
-          <p:cNvPr id="2" name="Title Placeholder 1"/>
+          <p:cNvPr id="2" name="Zástupný symbol pro nadpis 1"/>
           <p:cNvSpPr>
             <a:spLocks noGrp="1"/>
           </p:cNvSpPr>
@@ -2913,7 +2913,7 @@
           <a:p>
             <a:r>
               <a:rPr lang="cs-CZ" smtClean="0"/>
-              <a:t>Click to edit Master title style</a:t>
+              <a:t>Kliknutím lze upravit styl.</a:t>
             </a:r>
             <a:endParaRPr lang="cs-CZ" dirty="0"/>
           </a:p>
@@ -2921,7 +2921,7 @@
       </p:sp>
       <p:sp>
         <p:nvSpPr>
-          <p:cNvPr id="3" name="Text Placeholder 2"/>
+          <p:cNvPr id="3" name="Zástupný symbol pro text 2"/>
           <p:cNvSpPr>
             <a:spLocks noGrp="1"/>
           </p:cNvSpPr>
@@ -2947,35 +2947,35 @@
             <a:pPr lvl="0"/>
             <a:r>
               <a:rPr lang="cs-CZ" smtClean="0"/>
-              <a:t>Click to edit Master text styles</a:t>
+              <a:t>Kliknutím lze upravit styly předlohy textu.</a:t>
             </a:r>
           </a:p>
           <a:p>
             <a:pPr lvl="1"/>
             <a:r>
               <a:rPr lang="cs-CZ" smtClean="0"/>
-              <a:t>Second level</a:t>
+              <a:t>Druhá úroveň</a:t>
             </a:r>
           </a:p>
           <a:p>
             <a:pPr lvl="2"/>
             <a:r>
               <a:rPr lang="cs-CZ" smtClean="0"/>
-              <a:t>Third level</a:t>
+              <a:t>Třetí úroveň</a:t>
             </a:r>
           </a:p>
           <a:p>
             <a:pPr lvl="3"/>
             <a:r>
               <a:rPr lang="cs-CZ" smtClean="0"/>
-              <a:t>Fourth level</a:t>
+              <a:t>Čtvrtá úroveň</a:t>
             </a:r>
           </a:p>
           <a:p>
             <a:pPr lvl="4"/>
             <a:r>
               <a:rPr lang="cs-CZ" smtClean="0"/>
-              <a:t>Fifth level</a:t>
+              <a:t>Pátá úroveň</a:t>
             </a:r>
             <a:endParaRPr lang="cs-CZ" dirty="0"/>
           </a:p>
@@ -2983,7 +2983,7 @@
       </p:sp>
       <p:sp>
         <p:nvSpPr>
-          <p:cNvPr id="4" name="Date Placeholder 3"/>
+          <p:cNvPr id="4" name="Zástupný symbol pro datum 3"/>
           <p:cNvSpPr>
             <a:spLocks noGrp="1"/>
           </p:cNvSpPr>
@@ -3024,7 +3024,7 @@
       </p:sp>
       <p:sp>
         <p:nvSpPr>
-          <p:cNvPr id="5" name="Footer Placeholder 4"/>
+          <p:cNvPr id="5" name="Zástupný symbol pro zápatí 4"/>
           <p:cNvSpPr>
             <a:spLocks noGrp="1"/>
           </p:cNvSpPr>
@@ -3061,7 +3061,7 @@
       </p:sp>
       <p:sp>
         <p:nvSpPr>
-          <p:cNvPr id="6" name="Slide Number Placeholder 5"/>
+          <p:cNvPr id="6" name="Zástupný symbol pro číslo snímku 5"/>
           <p:cNvSpPr>
             <a:spLocks noGrp="1"/>
           </p:cNvSpPr>

</xml_diff>